<commit_message>
added week 2 day 3
</commit_message>
<xml_diff>
--- a/Learning Phase/Week 2/Day 2/Slides/2. Understanding the Java Virtual - Machine Memory Management/0-java-understanding-solving-memory-problems-m0-slides.pptx
+++ b/Learning Phase/Week 2/Day 2/Slides/2. Understanding the Java Virtual - Machine Memory Management/0-java-understanding-solving-memory-problems-m0-slides.pptx
@@ -290,24 +290,7 @@
           </a:bodyPr>
           <a:lstStyle/>
           <a:p>
-            <a:r>
-              <a:t>Presenter</a:t>
-            </a:r>
-          </a:p>
-          <a:p>
-            <a:r>
-              <a:t>2017-03-24 15:08:48</a:t>
-            </a:r>
-          </a:p>
-          <a:p>
-            <a:r>
-              <a:t>--------------------------------------------</a:t>
-            </a:r>
-          </a:p>
-          <a:p>
-            <a:r>
-              <a:t>Hello and welcome to “Understanding  and Solving Memory Problems”  authored by Richard Warburton.  Normally when we think about  the best to write Java code  we’re often thinking about the  maintainability of the software –  for example does it follow OOP  best practices, is it well tested,  can you add features easily.  This course is a bit different,  and in many ways more exciting  than that. It talks about the kind  of problems that can happen to  well factored and tested code in  production. We’ll  be  categorising and explaining a  series of problems that are  related to memory and we’ll  demonstrate how you can use  freely available tooling and  battle-tested approaches to  solve these problems.</a:t>
-            </a:r>
+            <a:endParaRPr dirty="0"/>
           </a:p>
         </p:txBody>
       </p:sp>
@@ -353,24 +336,7 @@
           </a:bodyPr>
           <a:lstStyle/>
           <a:p>
-            <a:r>
-              <a:t>Presenter</a:t>
-            </a:r>
-          </a:p>
-          <a:p>
-            <a:r>
-              <a:t>2017-03-24 15:08:49</a:t>
-            </a:r>
-          </a:p>
-          <a:p>
-            <a:r>
-              <a:t>--------------------------------------------</a:t>
-            </a:r>
-          </a:p>
-          <a:p>
-            <a:r>
-              <a:t>But before we get onto the problems  themselves I think we need to  explain why you should care  about memory problems at all in  your Java application.</a:t>
-            </a:r>
+            <a:endParaRPr dirty="0"/>
           </a:p>
         </p:txBody>
       </p:sp>
@@ -416,29 +382,7 @@
           </a:bodyPr>
           <a:lstStyle/>
           <a:p>
-            <a:r>
-              <a:t>Presenter</a:t>
-            </a:r>
-          </a:p>
-          <a:p>
-            <a:r>
-              <a:t>2017-03-24 15:08:49</a:t>
-            </a:r>
-          </a:p>
-          <a:p>
-            <a:r>
-              <a:t>--------------------------------------------</a:t>
-            </a:r>
-          </a:p>
-          <a:p>
-            <a:r>
-              <a:t>The first thing that people think  about when it comes to Java  Memory Problems is that Java  has a Garbage Collector or GC.  It was one of the first  mainstream, popular,  programming languages to use  GC, although far from the first.  It’s proven to be an incredibly  popular feature and huge  amount of engineering work has  been undertaken by GC writers  to make them really, really fast.  But the thing to remember with  GCs are that they are just  computer programs themselves,  not some kind of magic black  box that solves all your  problems. They will free up  memory when it isn’t in use by  an application but that is the end  of their remit.</a:t>
-            </a:r>
-          </a:p>
-          <a:p>
-            <a:r>
-              <a:t>If you write code that blindly leaks  memory, or uses too much  memory then you can still have  problems despite the existence  of a GC. This doesn’t mean that  the GC is broken – its just that  GCs blindly follow your  references around in memory.  The code and the objects  themselves are still King.</a:t>
-            </a:r>
+            <a:endParaRPr dirty="0"/>
           </a:p>
         </p:txBody>
       </p:sp>
@@ -589,7 +533,7 @@
           <a:p>
             <a:fld id="{D758AF22-05C2-4240-B9A9-6E3433676E01}" type="datetime1">
               <a:rPr lang="en-US" smtClean="0"/>
-              <a:t>10/18/2023</a:t>
+              <a:t>10/20/2023</a:t>
             </a:fld>
             <a:endParaRPr lang="en-US"/>
           </a:p>
@@ -760,7 +704,7 @@
           <a:p>
             <a:fld id="{FFDA3D94-6A2B-4E15-AF6C-C33241C3B78B}" type="datetime1">
               <a:rPr lang="en-US" smtClean="0"/>
-              <a:t>10/18/2023</a:t>
+              <a:t>10/20/2023</a:t>
             </a:fld>
             <a:endParaRPr lang="en-US"/>
           </a:p>
@@ -1036,7 +980,7 @@
           <a:p>
             <a:fld id="{D3319300-76DF-4FA4-91C3-26C7AAF4DFEC}" type="datetime1">
               <a:rPr lang="en-US" smtClean="0"/>
-              <a:t>10/18/2023</a:t>
+              <a:t>10/20/2023</a:t>
             </a:fld>
             <a:endParaRPr lang="en-US"/>
           </a:p>
@@ -1192,7 +1136,7 @@
           <a:p>
             <a:fld id="{718BB5A3-E2FB-43DB-90A2-8E39455573FB}" type="datetime1">
               <a:rPr lang="en-US" smtClean="0"/>
-              <a:t>10/18/2023</a:t>
+              <a:t>10/20/2023</a:t>
             </a:fld>
             <a:endParaRPr lang="en-US"/>
           </a:p>
@@ -1311,7 +1255,7 @@
           <a:p>
             <a:fld id="{E742DBC0-E116-4355-B52D-1BF6A611D270}" type="datetime1">
               <a:rPr lang="en-US" smtClean="0"/>
-              <a:t>10/18/2023</a:t>
+              <a:t>10/20/2023</a:t>
             </a:fld>
             <a:endParaRPr lang="en-US"/>
           </a:p>
@@ -1530,7 +1474,7 @@
           <a:p>
             <a:fld id="{032068BF-B7BC-4811-9F94-AF0FBF195AF5}" type="datetime1">
               <a:rPr lang="en-US" smtClean="0"/>
-              <a:t>10/18/2023</a:t>
+              <a:t>10/20/2023</a:t>
             </a:fld>
             <a:endParaRPr lang="en-US"/>
           </a:p>

</xml_diff>